<commit_message>
final changes to the ppt file
</commit_message>
<xml_diff>
--- a/census_exercise_presentation.pptx
+++ b/census_exercise_presentation.pptx
@@ -31545,9 +31545,9 @@
           </a:p>
           <a:p>
             <a:pPr>
-              <a:spcBef>
-                <a:spcPts val="0"/>
-              </a:spcBef>
+              <a:spcAft>
+                <a:spcPts val="0"/>
+              </a:spcAft>
             </a:pPr>
             <a:r>
               <a:rPr lang="en" dirty="0"/>
@@ -31556,6 +31556,42 @@
           </a:p>
         </p:txBody>
       </p:sp>
+      <p:pic>
+        <p:nvPicPr>
+          <p:cNvPr id="3" name="Graphic 2" descr="Gears with solid fill">
+            <a:extLst>
+              <a:ext uri="{FF2B5EF4-FFF2-40B4-BE49-F238E27FC236}">
+                <a16:creationId xmlns:a16="http://schemas.microsoft.com/office/drawing/2014/main" id="{8A461940-1D11-E87F-DD5D-2A84B71B6313}"/>
+              </a:ext>
+            </a:extLst>
+          </p:cNvPr>
+          <p:cNvPicPr>
+            <a:picLocks noChangeAspect="1"/>
+          </p:cNvPicPr>
+          <p:nvPr/>
+        </p:nvPicPr>
+        <p:blipFill>
+          <a:blip r:embed="rId3">
+            <a:extLst>
+              <a:ext uri="{96DAC541-7B7A-43D3-8B79-37D633B846F1}">
+                <asvg:svgBlip xmlns:asvg="http://schemas.microsoft.com/office/drawing/2016/SVG/main" r:embed="rId4"/>
+              </a:ext>
+            </a:extLst>
+          </a:blip>
+          <a:stretch>
+            <a:fillRect/>
+          </a:stretch>
+        </p:blipFill>
+        <p:spPr>
+          <a:xfrm>
+            <a:off x="6595672" y="3226322"/>
+            <a:ext cx="1526498" cy="1526498"/>
+          </a:xfrm>
+          <a:prstGeom prst="rect">
+            <a:avLst/>
+          </a:prstGeom>
+        </p:spPr>
+      </p:pic>
     </p:spTree>
     <p:extLst>
       <p:ext uri="{BB962C8B-B14F-4D97-AF65-F5344CB8AC3E}">

</xml_diff>